<commit_message>
Writing to finish technical parts of report
</commit_message>
<xml_diff>
--- a/Report/Sections/Diagrams/Flow Charts.pptx
+++ b/Report/Sections/Diagrams/Flow Charts.pptx
@@ -244,7 +244,7 @@
           <a:p>
             <a:fld id="{AF6D8D9A-20AD-4730-9EAC-2EA2F2EDC4AA}" type="datetimeFigureOut">
               <a:rPr lang="en-GB" smtClean="0"/>
-              <a:t>01/05/2018</a:t>
+              <a:t>04/05/2018</a:t>
             </a:fld>
             <a:endParaRPr lang="en-GB"/>
           </a:p>
@@ -414,7 +414,7 @@
           <a:p>
             <a:fld id="{AF6D8D9A-20AD-4730-9EAC-2EA2F2EDC4AA}" type="datetimeFigureOut">
               <a:rPr lang="en-GB" smtClean="0"/>
-              <a:t>01/05/2018</a:t>
+              <a:t>04/05/2018</a:t>
             </a:fld>
             <a:endParaRPr lang="en-GB"/>
           </a:p>
@@ -594,7 +594,7 @@
           <a:p>
             <a:fld id="{AF6D8D9A-20AD-4730-9EAC-2EA2F2EDC4AA}" type="datetimeFigureOut">
               <a:rPr lang="en-GB" smtClean="0"/>
-              <a:t>01/05/2018</a:t>
+              <a:t>04/05/2018</a:t>
             </a:fld>
             <a:endParaRPr lang="en-GB"/>
           </a:p>
@@ -764,7 +764,7 @@
           <a:p>
             <a:fld id="{AF6D8D9A-20AD-4730-9EAC-2EA2F2EDC4AA}" type="datetimeFigureOut">
               <a:rPr lang="en-GB" smtClean="0"/>
-              <a:t>01/05/2018</a:t>
+              <a:t>04/05/2018</a:t>
             </a:fld>
             <a:endParaRPr lang="en-GB"/>
           </a:p>
@@ -1008,7 +1008,7 @@
           <a:p>
             <a:fld id="{AF6D8D9A-20AD-4730-9EAC-2EA2F2EDC4AA}" type="datetimeFigureOut">
               <a:rPr lang="en-GB" smtClean="0"/>
-              <a:t>01/05/2018</a:t>
+              <a:t>04/05/2018</a:t>
             </a:fld>
             <a:endParaRPr lang="en-GB"/>
           </a:p>
@@ -1240,7 +1240,7 @@
           <a:p>
             <a:fld id="{AF6D8D9A-20AD-4730-9EAC-2EA2F2EDC4AA}" type="datetimeFigureOut">
               <a:rPr lang="en-GB" smtClean="0"/>
-              <a:t>01/05/2018</a:t>
+              <a:t>04/05/2018</a:t>
             </a:fld>
             <a:endParaRPr lang="en-GB"/>
           </a:p>
@@ -1607,7 +1607,7 @@
           <a:p>
             <a:fld id="{AF6D8D9A-20AD-4730-9EAC-2EA2F2EDC4AA}" type="datetimeFigureOut">
               <a:rPr lang="en-GB" smtClean="0"/>
-              <a:t>01/05/2018</a:t>
+              <a:t>04/05/2018</a:t>
             </a:fld>
             <a:endParaRPr lang="en-GB"/>
           </a:p>
@@ -1725,7 +1725,7 @@
           <a:p>
             <a:fld id="{AF6D8D9A-20AD-4730-9EAC-2EA2F2EDC4AA}" type="datetimeFigureOut">
               <a:rPr lang="en-GB" smtClean="0"/>
-              <a:t>01/05/2018</a:t>
+              <a:t>04/05/2018</a:t>
             </a:fld>
             <a:endParaRPr lang="en-GB"/>
           </a:p>
@@ -1820,7 +1820,7 @@
           <a:p>
             <a:fld id="{AF6D8D9A-20AD-4730-9EAC-2EA2F2EDC4AA}" type="datetimeFigureOut">
               <a:rPr lang="en-GB" smtClean="0"/>
-              <a:t>01/05/2018</a:t>
+              <a:t>04/05/2018</a:t>
             </a:fld>
             <a:endParaRPr lang="en-GB"/>
           </a:p>
@@ -2097,7 +2097,7 @@
           <a:p>
             <a:fld id="{AF6D8D9A-20AD-4730-9EAC-2EA2F2EDC4AA}" type="datetimeFigureOut">
               <a:rPr lang="en-GB" smtClean="0"/>
-              <a:t>01/05/2018</a:t>
+              <a:t>04/05/2018</a:t>
             </a:fld>
             <a:endParaRPr lang="en-GB"/>
           </a:p>
@@ -2354,7 +2354,7 @@
           <a:p>
             <a:fld id="{AF6D8D9A-20AD-4730-9EAC-2EA2F2EDC4AA}" type="datetimeFigureOut">
               <a:rPr lang="en-GB" smtClean="0"/>
-              <a:t>01/05/2018</a:t>
+              <a:t>04/05/2018</a:t>
             </a:fld>
             <a:endParaRPr lang="en-GB"/>
           </a:p>
@@ -2567,7 +2567,7 @@
           <a:p>
             <a:fld id="{AF6D8D9A-20AD-4730-9EAC-2EA2F2EDC4AA}" type="datetimeFigureOut">
               <a:rPr lang="en-GB" smtClean="0"/>
-              <a:t>01/05/2018</a:t>
+              <a:t>04/05/2018</a:t>
             </a:fld>
             <a:endParaRPr lang="en-GB"/>
           </a:p>
@@ -8731,14 +8731,7 @@
                 <a:pPr algn="ctr"/>
                 <a:r>
                   <a:rPr lang="en-GB" sz="1600" dirty="0"/>
-                  <a:t>Save Input Masks</a:t>
-                </a:r>
-              </a:p>
-              <a:p>
-                <a:pPr algn="ctr"/>
-                <a:r>
-                  <a:rPr lang="en-GB" sz="1600" dirty="0"/>
-                  <a:t>to Binary File</a:t>
+                  <a:t>Fetch Masks From Binary File</a:t>
                 </a:r>
               </a:p>
             </p:txBody>

</xml_diff>

<commit_message>
Finishing off Literature Review
</commit_message>
<xml_diff>
--- a/Report/Sections/Diagrams/Flow Charts.pptx
+++ b/Report/Sections/Diagrams/Flow Charts.pptx
@@ -7,6 +7,7 @@
   <p:sldIdLst>
     <p:sldId id="256" r:id="rId2"/>
     <p:sldId id="257" r:id="rId3"/>
+    <p:sldId id="258" r:id="rId4"/>
   </p:sldIdLst>
   <p:sldSz cx="6858000" cy="9906000" type="A4"/>
   <p:notesSz cx="6858000" cy="9144000"/>
@@ -244,7 +245,7 @@
           <a:p>
             <a:fld id="{AF6D8D9A-20AD-4730-9EAC-2EA2F2EDC4AA}" type="datetimeFigureOut">
               <a:rPr lang="en-GB" smtClean="0"/>
-              <a:t>04/05/2018</a:t>
+              <a:t>12/05/2018</a:t>
             </a:fld>
             <a:endParaRPr lang="en-GB"/>
           </a:p>
@@ -414,7 +415,7 @@
           <a:p>
             <a:fld id="{AF6D8D9A-20AD-4730-9EAC-2EA2F2EDC4AA}" type="datetimeFigureOut">
               <a:rPr lang="en-GB" smtClean="0"/>
-              <a:t>04/05/2018</a:t>
+              <a:t>12/05/2018</a:t>
             </a:fld>
             <a:endParaRPr lang="en-GB"/>
           </a:p>
@@ -594,7 +595,7 @@
           <a:p>
             <a:fld id="{AF6D8D9A-20AD-4730-9EAC-2EA2F2EDC4AA}" type="datetimeFigureOut">
               <a:rPr lang="en-GB" smtClean="0"/>
-              <a:t>04/05/2018</a:t>
+              <a:t>12/05/2018</a:t>
             </a:fld>
             <a:endParaRPr lang="en-GB"/>
           </a:p>
@@ -764,7 +765,7 @@
           <a:p>
             <a:fld id="{AF6D8D9A-20AD-4730-9EAC-2EA2F2EDC4AA}" type="datetimeFigureOut">
               <a:rPr lang="en-GB" smtClean="0"/>
-              <a:t>04/05/2018</a:t>
+              <a:t>12/05/2018</a:t>
             </a:fld>
             <a:endParaRPr lang="en-GB"/>
           </a:p>
@@ -1008,7 +1009,7 @@
           <a:p>
             <a:fld id="{AF6D8D9A-20AD-4730-9EAC-2EA2F2EDC4AA}" type="datetimeFigureOut">
               <a:rPr lang="en-GB" smtClean="0"/>
-              <a:t>04/05/2018</a:t>
+              <a:t>12/05/2018</a:t>
             </a:fld>
             <a:endParaRPr lang="en-GB"/>
           </a:p>
@@ -1240,7 +1241,7 @@
           <a:p>
             <a:fld id="{AF6D8D9A-20AD-4730-9EAC-2EA2F2EDC4AA}" type="datetimeFigureOut">
               <a:rPr lang="en-GB" smtClean="0"/>
-              <a:t>04/05/2018</a:t>
+              <a:t>12/05/2018</a:t>
             </a:fld>
             <a:endParaRPr lang="en-GB"/>
           </a:p>
@@ -1607,7 +1608,7 @@
           <a:p>
             <a:fld id="{AF6D8D9A-20AD-4730-9EAC-2EA2F2EDC4AA}" type="datetimeFigureOut">
               <a:rPr lang="en-GB" smtClean="0"/>
-              <a:t>04/05/2018</a:t>
+              <a:t>12/05/2018</a:t>
             </a:fld>
             <a:endParaRPr lang="en-GB"/>
           </a:p>
@@ -1725,7 +1726,7 @@
           <a:p>
             <a:fld id="{AF6D8D9A-20AD-4730-9EAC-2EA2F2EDC4AA}" type="datetimeFigureOut">
               <a:rPr lang="en-GB" smtClean="0"/>
-              <a:t>04/05/2018</a:t>
+              <a:t>12/05/2018</a:t>
             </a:fld>
             <a:endParaRPr lang="en-GB"/>
           </a:p>
@@ -1820,7 +1821,7 @@
           <a:p>
             <a:fld id="{AF6D8D9A-20AD-4730-9EAC-2EA2F2EDC4AA}" type="datetimeFigureOut">
               <a:rPr lang="en-GB" smtClean="0"/>
-              <a:t>04/05/2018</a:t>
+              <a:t>12/05/2018</a:t>
             </a:fld>
             <a:endParaRPr lang="en-GB"/>
           </a:p>
@@ -2097,7 +2098,7 @@
           <a:p>
             <a:fld id="{AF6D8D9A-20AD-4730-9EAC-2EA2F2EDC4AA}" type="datetimeFigureOut">
               <a:rPr lang="en-GB" smtClean="0"/>
-              <a:t>04/05/2018</a:t>
+              <a:t>12/05/2018</a:t>
             </a:fld>
             <a:endParaRPr lang="en-GB"/>
           </a:p>
@@ -2354,7 +2355,7 @@
           <a:p>
             <a:fld id="{AF6D8D9A-20AD-4730-9EAC-2EA2F2EDC4AA}" type="datetimeFigureOut">
               <a:rPr lang="en-GB" smtClean="0"/>
-              <a:t>04/05/2018</a:t>
+              <a:t>12/05/2018</a:t>
             </a:fld>
             <a:endParaRPr lang="en-GB"/>
           </a:p>
@@ -2567,7 +2568,7 @@
           <a:p>
             <a:fld id="{AF6D8D9A-20AD-4730-9EAC-2EA2F2EDC4AA}" type="datetimeFigureOut">
               <a:rPr lang="en-GB" smtClean="0"/>
-              <a:t>04/05/2018</a:t>
+              <a:t>12/05/2018</a:t>
             </a:fld>
             <a:endParaRPr lang="en-GB"/>
           </a:p>
@@ -10527,6 +10528,1291 @@
 </p:sld>
 </file>
 
+<file path=ppt/slides/slide3.xml><?xml version="1.0" encoding="utf-8"?>
+<p:sld xmlns:a="http://schemas.openxmlformats.org/drawingml/2006/main" xmlns:r="http://schemas.openxmlformats.org/officeDocument/2006/relationships" xmlns:p="http://schemas.openxmlformats.org/presentationml/2006/main">
+  <p:cSld>
+    <p:spTree>
+      <p:nvGrpSpPr>
+        <p:cNvPr id="1" name=""/>
+        <p:cNvGrpSpPr/>
+        <p:nvPr/>
+      </p:nvGrpSpPr>
+      <p:grpSpPr>
+        <a:xfrm>
+          <a:off x="0" y="0"/>
+          <a:ext cx="0" cy="0"/>
+          <a:chOff x="0" y="0"/>
+          <a:chExt cx="0" cy="0"/>
+        </a:xfrm>
+      </p:grpSpPr>
+      <p:grpSp>
+        <p:nvGrpSpPr>
+          <p:cNvPr id="177" name="Group 176">
+            <a:extLst>
+              <a:ext uri="{FF2B5EF4-FFF2-40B4-BE49-F238E27FC236}">
+                <a16:creationId xmlns:a16="http://schemas.microsoft.com/office/drawing/2014/main" id="{1935CB11-6BF9-4755-A9E3-BC19F4E1153D}"/>
+              </a:ext>
+            </a:extLst>
+          </p:cNvPr>
+          <p:cNvGrpSpPr/>
+          <p:nvPr/>
+        </p:nvGrpSpPr>
+        <p:grpSpPr>
+          <a:xfrm>
+            <a:off x="263047" y="1490597"/>
+            <a:ext cx="6313117" cy="6374632"/>
+            <a:chOff x="263047" y="1490597"/>
+            <a:chExt cx="6313117" cy="6374632"/>
+          </a:xfrm>
+        </p:grpSpPr>
+        <p:sp>
+          <p:nvSpPr>
+            <p:cNvPr id="3" name="Rectangle 2">
+              <a:extLst>
+                <a:ext uri="{FF2B5EF4-FFF2-40B4-BE49-F238E27FC236}">
+                  <a16:creationId xmlns:a16="http://schemas.microsoft.com/office/drawing/2014/main" id="{4C66CFCB-E195-4E57-9675-2DAC94718A5F}"/>
+                </a:ext>
+              </a:extLst>
+            </p:cNvPr>
+            <p:cNvSpPr/>
+            <p:nvPr/>
+          </p:nvSpPr>
+          <p:spPr>
+            <a:xfrm>
+              <a:off x="263047" y="1490597"/>
+              <a:ext cx="6313117" cy="6374632"/>
+            </a:xfrm>
+            <a:prstGeom prst="rect">
+              <a:avLst/>
+            </a:prstGeom>
+            <a:solidFill>
+              <a:schemeClr val="bg1"/>
+            </a:solidFill>
+            <a:ln>
+              <a:solidFill>
+                <a:schemeClr val="bg1"/>
+              </a:solidFill>
+            </a:ln>
+          </p:spPr>
+          <p:style>
+            <a:lnRef idx="2">
+              <a:schemeClr val="accent1">
+                <a:shade val="50000"/>
+              </a:schemeClr>
+            </a:lnRef>
+            <a:fillRef idx="1">
+              <a:schemeClr val="accent1"/>
+            </a:fillRef>
+            <a:effectRef idx="0">
+              <a:schemeClr val="accent1"/>
+            </a:effectRef>
+            <a:fontRef idx="minor">
+              <a:schemeClr val="lt1"/>
+            </a:fontRef>
+          </p:style>
+          <p:txBody>
+            <a:bodyPr rtlCol="0" anchor="ctr"/>
+            <a:lstStyle/>
+            <a:p>
+              <a:pPr algn="ctr"/>
+              <a:endParaRPr lang="en-GB"/>
+            </a:p>
+          </p:txBody>
+        </p:sp>
+        <p:sp>
+          <p:nvSpPr>
+            <p:cNvPr id="14" name="Flowchart: Terminator 13">
+              <a:extLst>
+                <a:ext uri="{FF2B5EF4-FFF2-40B4-BE49-F238E27FC236}">
+                  <a16:creationId xmlns:a16="http://schemas.microsoft.com/office/drawing/2014/main" id="{6D1C7C9C-2581-4271-9BF6-80E0CFFD0CDF}"/>
+                </a:ext>
+              </a:extLst>
+            </p:cNvPr>
+            <p:cNvSpPr/>
+            <p:nvPr/>
+          </p:nvSpPr>
+          <p:spPr>
+            <a:xfrm>
+              <a:off x="438033" y="1776336"/>
+              <a:ext cx="1653394" cy="545620"/>
+            </a:xfrm>
+            <a:prstGeom prst="flowChartTerminator">
+              <a:avLst/>
+            </a:prstGeom>
+            <a:ln>
+              <a:solidFill>
+                <a:srgbClr val="92D050"/>
+              </a:solidFill>
+            </a:ln>
+          </p:spPr>
+          <p:style>
+            <a:lnRef idx="0">
+              <a:schemeClr val="accent6"/>
+            </a:lnRef>
+            <a:fillRef idx="3">
+              <a:schemeClr val="accent6"/>
+            </a:fillRef>
+            <a:effectRef idx="3">
+              <a:schemeClr val="accent6"/>
+            </a:effectRef>
+            <a:fontRef idx="minor">
+              <a:schemeClr val="lt1"/>
+            </a:fontRef>
+          </p:style>
+          <p:txBody>
+            <a:bodyPr rtlCol="0" anchor="ctr"/>
+            <a:lstStyle/>
+            <a:p>
+              <a:pPr algn="ctr"/>
+              <a:r>
+                <a:rPr lang="en-GB" dirty="0"/>
+                <a:t>Start</a:t>
+              </a:r>
+            </a:p>
+          </p:txBody>
+        </p:sp>
+        <p:sp>
+          <p:nvSpPr>
+            <p:cNvPr id="17" name="Flowchart: Decision 16">
+              <a:extLst>
+                <a:ext uri="{FF2B5EF4-FFF2-40B4-BE49-F238E27FC236}">
+                  <a16:creationId xmlns:a16="http://schemas.microsoft.com/office/drawing/2014/main" id="{A0C48123-054A-45F5-A880-CDDF9DAF8FA8}"/>
+                </a:ext>
+              </a:extLst>
+            </p:cNvPr>
+            <p:cNvSpPr/>
+            <p:nvPr/>
+          </p:nvSpPr>
+          <p:spPr>
+            <a:xfrm>
+              <a:off x="2103918" y="2697553"/>
+              <a:ext cx="2650164" cy="1207770"/>
+            </a:xfrm>
+            <a:prstGeom prst="flowChartDecision">
+              <a:avLst/>
+            </a:prstGeom>
+            <a:gradFill flip="none" rotWithShape="1">
+              <a:gsLst>
+                <a:gs pos="0">
+                  <a:schemeClr val="accent1">
+                    <a:lumMod val="67000"/>
+                  </a:schemeClr>
+                </a:gs>
+                <a:gs pos="48000">
+                  <a:schemeClr val="accent1">
+                    <a:lumMod val="97000"/>
+                    <a:lumOff val="3000"/>
+                  </a:schemeClr>
+                </a:gs>
+                <a:gs pos="100000">
+                  <a:schemeClr val="accent1">
+                    <a:lumMod val="60000"/>
+                    <a:lumOff val="40000"/>
+                  </a:schemeClr>
+                </a:gs>
+              </a:gsLst>
+              <a:lin ang="16200000" scaled="1"/>
+              <a:tileRect/>
+            </a:gradFill>
+            <a:ln>
+              <a:solidFill>
+                <a:srgbClr val="0070C0"/>
+              </a:solidFill>
+            </a:ln>
+          </p:spPr>
+          <p:style>
+            <a:lnRef idx="0">
+              <a:scrgbClr r="0" g="0" b="0"/>
+            </a:lnRef>
+            <a:fillRef idx="0">
+              <a:scrgbClr r="0" g="0" b="0"/>
+            </a:fillRef>
+            <a:effectRef idx="0">
+              <a:scrgbClr r="0" g="0" b="0"/>
+            </a:effectRef>
+            <a:fontRef idx="minor">
+              <a:schemeClr val="lt1"/>
+            </a:fontRef>
+          </p:style>
+          <p:txBody>
+            <a:bodyPr rtlCol="0" anchor="ctr"/>
+            <a:lstStyle/>
+            <a:p>
+              <a:pPr algn="ctr"/>
+              <a:r>
+                <a:rPr lang="en-GB" dirty="0"/>
+                <a:t>Peripherals and Screen?</a:t>
+              </a:r>
+            </a:p>
+          </p:txBody>
+        </p:sp>
+        <p:sp>
+          <p:nvSpPr>
+            <p:cNvPr id="18" name="Flowchart: Terminator 17">
+              <a:extLst>
+                <a:ext uri="{FF2B5EF4-FFF2-40B4-BE49-F238E27FC236}">
+                  <a16:creationId xmlns:a16="http://schemas.microsoft.com/office/drawing/2014/main" id="{BF4C97C6-4B89-42E6-A73F-C90E098C09A9}"/>
+                </a:ext>
+              </a:extLst>
+            </p:cNvPr>
+            <p:cNvSpPr/>
+            <p:nvPr/>
+          </p:nvSpPr>
+          <p:spPr>
+            <a:xfrm>
+              <a:off x="4764856" y="6975704"/>
+              <a:ext cx="1653394" cy="545620"/>
+            </a:xfrm>
+            <a:prstGeom prst="flowChartTerminator">
+              <a:avLst/>
+            </a:prstGeom>
+            <a:gradFill flip="none" rotWithShape="1">
+              <a:gsLst>
+                <a:gs pos="0">
+                  <a:schemeClr val="accent2">
+                    <a:lumMod val="67000"/>
+                  </a:schemeClr>
+                </a:gs>
+                <a:gs pos="48000">
+                  <a:schemeClr val="accent2">
+                    <a:lumMod val="97000"/>
+                    <a:lumOff val="3000"/>
+                  </a:schemeClr>
+                </a:gs>
+                <a:gs pos="100000">
+                  <a:schemeClr val="accent2">
+                    <a:lumMod val="60000"/>
+                    <a:lumOff val="40000"/>
+                  </a:schemeClr>
+                </a:gs>
+              </a:gsLst>
+              <a:lin ang="16200000" scaled="1"/>
+              <a:tileRect/>
+            </a:gradFill>
+            <a:ln>
+              <a:solidFill>
+                <a:schemeClr val="accent2">
+                  <a:lumMod val="75000"/>
+                </a:schemeClr>
+              </a:solidFill>
+            </a:ln>
+          </p:spPr>
+          <p:style>
+            <a:lnRef idx="0">
+              <a:scrgbClr r="0" g="0" b="0"/>
+            </a:lnRef>
+            <a:fillRef idx="0">
+              <a:scrgbClr r="0" g="0" b="0"/>
+            </a:fillRef>
+            <a:effectRef idx="0">
+              <a:scrgbClr r="0" g="0" b="0"/>
+            </a:effectRef>
+            <a:fontRef idx="minor">
+              <a:schemeClr val="lt1"/>
+            </a:fontRef>
+          </p:style>
+          <p:txBody>
+            <a:bodyPr rtlCol="0" anchor="ctr"/>
+            <a:lstStyle/>
+            <a:p>
+              <a:pPr algn="ctr"/>
+              <a:r>
+                <a:rPr lang="en-GB" dirty="0"/>
+                <a:t>End</a:t>
+              </a:r>
+            </a:p>
+          </p:txBody>
+        </p:sp>
+        <p:sp>
+          <p:nvSpPr>
+            <p:cNvPr id="19" name="TextBox 18">
+              <a:extLst>
+                <a:ext uri="{FF2B5EF4-FFF2-40B4-BE49-F238E27FC236}">
+                  <a16:creationId xmlns:a16="http://schemas.microsoft.com/office/drawing/2014/main" id="{0AFA8137-A397-4260-A577-F92ADD69F952}"/>
+                </a:ext>
+              </a:extLst>
+            </p:cNvPr>
+            <p:cNvSpPr txBox="1"/>
+            <p:nvPr/>
+          </p:nvSpPr>
+          <p:spPr>
+            <a:xfrm>
+              <a:off x="2296138" y="2040771"/>
+              <a:ext cx="1441450" cy="338554"/>
+            </a:xfrm>
+            <a:prstGeom prst="rect">
+              <a:avLst/>
+            </a:prstGeom>
+            <a:noFill/>
+          </p:spPr>
+          <p:txBody>
+            <a:bodyPr wrap="square" rtlCol="0">
+              <a:spAutoFit/>
+            </a:bodyPr>
+            <a:lstStyle/>
+            <a:p>
+              <a:pPr algn="ctr"/>
+              <a:r>
+                <a:rPr lang="en-GB" sz="1600" dirty="0"/>
+                <a:t>False</a:t>
+              </a:r>
+            </a:p>
+          </p:txBody>
+        </p:sp>
+        <p:cxnSp>
+          <p:nvCxnSpPr>
+            <p:cNvPr id="27" name="Connector: Elbow 26">
+              <a:extLst>
+                <a:ext uri="{FF2B5EF4-FFF2-40B4-BE49-F238E27FC236}">
+                  <a16:creationId xmlns:a16="http://schemas.microsoft.com/office/drawing/2014/main" id="{E8A0CA6C-C95E-4427-ADB5-BBA85340B6B2}"/>
+                </a:ext>
+              </a:extLst>
+            </p:cNvPr>
+            <p:cNvCxnSpPr>
+              <a:cxnSpLocks/>
+              <a:stCxn id="17" idx="3"/>
+              <a:endCxn id="113" idx="0"/>
+            </p:cNvCxnSpPr>
+            <p:nvPr/>
+          </p:nvCxnSpPr>
+          <p:spPr>
+            <a:xfrm>
+              <a:off x="4754082" y="3301438"/>
+              <a:ext cx="614086" cy="294981"/>
+            </a:xfrm>
+            <a:prstGeom prst="bentConnector2">
+              <a:avLst/>
+            </a:prstGeom>
+            <a:ln w="38100">
+              <a:solidFill>
+                <a:schemeClr val="tx1"/>
+              </a:solidFill>
+              <a:tailEnd type="triangle"/>
+            </a:ln>
+          </p:spPr>
+          <p:style>
+            <a:lnRef idx="1">
+              <a:schemeClr val="accent1"/>
+            </a:lnRef>
+            <a:fillRef idx="0">
+              <a:schemeClr val="accent1"/>
+            </a:fillRef>
+            <a:effectRef idx="0">
+              <a:schemeClr val="accent1"/>
+            </a:effectRef>
+            <a:fontRef idx="minor">
+              <a:schemeClr val="tx1"/>
+            </a:fontRef>
+          </p:style>
+        </p:cxnSp>
+        <p:cxnSp>
+          <p:nvCxnSpPr>
+            <p:cNvPr id="28" name="Connector: Elbow 27">
+              <a:extLst>
+                <a:ext uri="{FF2B5EF4-FFF2-40B4-BE49-F238E27FC236}">
+                  <a16:creationId xmlns:a16="http://schemas.microsoft.com/office/drawing/2014/main" id="{85406745-7356-4ADE-AC40-3A93BC2B6DD6}"/>
+                </a:ext>
+              </a:extLst>
+            </p:cNvPr>
+            <p:cNvCxnSpPr>
+              <a:cxnSpLocks/>
+              <a:stCxn id="17" idx="1"/>
+              <a:endCxn id="107" idx="0"/>
+            </p:cNvCxnSpPr>
+            <p:nvPr/>
+          </p:nvCxnSpPr>
+          <p:spPr>
+            <a:xfrm rot="10800000" flipV="1">
+              <a:off x="1488116" y="3301438"/>
+              <a:ext cx="615803" cy="832280"/>
+            </a:xfrm>
+            <a:prstGeom prst="bentConnector2">
+              <a:avLst/>
+            </a:prstGeom>
+            <a:ln w="38100">
+              <a:solidFill>
+                <a:schemeClr val="tx1"/>
+              </a:solidFill>
+              <a:tailEnd type="triangle"/>
+            </a:ln>
+          </p:spPr>
+          <p:style>
+            <a:lnRef idx="1">
+              <a:schemeClr val="accent1"/>
+            </a:lnRef>
+            <a:fillRef idx="0">
+              <a:schemeClr val="accent1"/>
+            </a:fillRef>
+            <a:effectRef idx="0">
+              <a:schemeClr val="accent1"/>
+            </a:effectRef>
+            <a:fontRef idx="minor">
+              <a:schemeClr val="tx1"/>
+            </a:fontRef>
+          </p:style>
+        </p:cxnSp>
+        <p:sp>
+          <p:nvSpPr>
+            <p:cNvPr id="44" name="TextBox 43">
+              <a:extLst>
+                <a:ext uri="{FF2B5EF4-FFF2-40B4-BE49-F238E27FC236}">
+                  <a16:creationId xmlns:a16="http://schemas.microsoft.com/office/drawing/2014/main" id="{A594CB80-F2D6-4B99-AF37-27D1D0E27F92}"/>
+                </a:ext>
+              </a:extLst>
+            </p:cNvPr>
+            <p:cNvSpPr txBox="1"/>
+            <p:nvPr/>
+          </p:nvSpPr>
+          <p:spPr>
+            <a:xfrm>
+              <a:off x="1069363" y="2973374"/>
+              <a:ext cx="1441450" cy="338554"/>
+            </a:xfrm>
+            <a:prstGeom prst="rect">
+              <a:avLst/>
+            </a:prstGeom>
+            <a:noFill/>
+          </p:spPr>
+          <p:txBody>
+            <a:bodyPr wrap="square" rtlCol="0">
+              <a:spAutoFit/>
+            </a:bodyPr>
+            <a:lstStyle/>
+            <a:p>
+              <a:pPr algn="ctr"/>
+              <a:r>
+                <a:rPr lang="en-GB" sz="1600" dirty="0"/>
+                <a:t>Yes</a:t>
+              </a:r>
+            </a:p>
+          </p:txBody>
+        </p:sp>
+        <p:sp>
+          <p:nvSpPr>
+            <p:cNvPr id="48" name="Flowchart: Process 47">
+              <a:extLst>
+                <a:ext uri="{FF2B5EF4-FFF2-40B4-BE49-F238E27FC236}">
+                  <a16:creationId xmlns:a16="http://schemas.microsoft.com/office/drawing/2014/main" id="{C0FA097C-59F5-44A0-BAC5-233C6662BE08}"/>
+                </a:ext>
+              </a:extLst>
+            </p:cNvPr>
+            <p:cNvSpPr/>
+            <p:nvPr/>
+          </p:nvSpPr>
+          <p:spPr>
+            <a:xfrm>
+              <a:off x="2378918" y="1660161"/>
+              <a:ext cx="2100164" cy="777971"/>
+            </a:xfrm>
+            <a:prstGeom prst="flowChartProcess">
+              <a:avLst/>
+            </a:prstGeom>
+            <a:gradFill flip="none" rotWithShape="1">
+              <a:gsLst>
+                <a:gs pos="0">
+                  <a:schemeClr val="accent5">
+                    <a:lumMod val="67000"/>
+                  </a:schemeClr>
+                </a:gs>
+                <a:gs pos="48000">
+                  <a:schemeClr val="accent5">
+                    <a:lumMod val="97000"/>
+                    <a:lumOff val="3000"/>
+                  </a:schemeClr>
+                </a:gs>
+                <a:gs pos="100000">
+                  <a:schemeClr val="accent5">
+                    <a:lumMod val="60000"/>
+                    <a:lumOff val="40000"/>
+                  </a:schemeClr>
+                </a:gs>
+              </a:gsLst>
+              <a:lin ang="16200000" scaled="1"/>
+              <a:tileRect/>
+            </a:gradFill>
+            <a:ln>
+              <a:solidFill>
+                <a:srgbClr val="0070C0"/>
+              </a:solidFill>
+            </a:ln>
+          </p:spPr>
+          <p:style>
+            <a:lnRef idx="0">
+              <a:scrgbClr r="0" g="0" b="0"/>
+            </a:lnRef>
+            <a:fillRef idx="0">
+              <a:scrgbClr r="0" g="0" b="0"/>
+            </a:fillRef>
+            <a:effectRef idx="0">
+              <a:scrgbClr r="0" g="0" b="0"/>
+            </a:effectRef>
+            <a:fontRef idx="minor">
+              <a:schemeClr val="lt1"/>
+            </a:fontRef>
+          </p:style>
+          <p:txBody>
+            <a:bodyPr rtlCol="0" anchor="ctr"/>
+            <a:lstStyle/>
+            <a:p>
+              <a:pPr algn="ctr"/>
+              <a:r>
+                <a:rPr lang="en-GB" dirty="0"/>
+                <a:t>Install Raspbian on SD Card</a:t>
+              </a:r>
+            </a:p>
+          </p:txBody>
+        </p:sp>
+        <p:cxnSp>
+          <p:nvCxnSpPr>
+            <p:cNvPr id="56" name="Straight Arrow Connector 55">
+              <a:extLst>
+                <a:ext uri="{FF2B5EF4-FFF2-40B4-BE49-F238E27FC236}">
+                  <a16:creationId xmlns:a16="http://schemas.microsoft.com/office/drawing/2014/main" id="{9CBB4B28-4360-4947-ADEE-A456057CF86E}"/>
+                </a:ext>
+              </a:extLst>
+            </p:cNvPr>
+            <p:cNvCxnSpPr>
+              <a:cxnSpLocks/>
+              <a:stCxn id="14" idx="3"/>
+              <a:endCxn id="48" idx="1"/>
+            </p:cNvCxnSpPr>
+            <p:nvPr/>
+          </p:nvCxnSpPr>
+          <p:spPr>
+            <a:xfrm>
+              <a:off x="2091427" y="2049146"/>
+              <a:ext cx="287491" cy="1"/>
+            </a:xfrm>
+            <a:prstGeom prst="straightConnector1">
+              <a:avLst/>
+            </a:prstGeom>
+            <a:ln w="38100">
+              <a:solidFill>
+                <a:schemeClr val="tx1"/>
+              </a:solidFill>
+              <a:tailEnd type="triangle"/>
+            </a:ln>
+          </p:spPr>
+          <p:style>
+            <a:lnRef idx="1">
+              <a:schemeClr val="accent1"/>
+            </a:lnRef>
+            <a:fillRef idx="0">
+              <a:schemeClr val="accent1"/>
+            </a:fillRef>
+            <a:effectRef idx="0">
+              <a:schemeClr val="accent1"/>
+            </a:effectRef>
+            <a:fontRef idx="minor">
+              <a:schemeClr val="tx1"/>
+            </a:fontRef>
+          </p:style>
+        </p:cxnSp>
+        <p:cxnSp>
+          <p:nvCxnSpPr>
+            <p:cNvPr id="57" name="Straight Arrow Connector 56">
+              <a:extLst>
+                <a:ext uri="{FF2B5EF4-FFF2-40B4-BE49-F238E27FC236}">
+                  <a16:creationId xmlns:a16="http://schemas.microsoft.com/office/drawing/2014/main" id="{D5644A18-3CF0-485C-B221-D99B3F5BB2EE}"/>
+                </a:ext>
+              </a:extLst>
+            </p:cNvPr>
+            <p:cNvCxnSpPr>
+              <a:cxnSpLocks/>
+              <a:stCxn id="48" idx="2"/>
+              <a:endCxn id="17" idx="0"/>
+            </p:cNvCxnSpPr>
+            <p:nvPr/>
+          </p:nvCxnSpPr>
+          <p:spPr>
+            <a:xfrm>
+              <a:off x="3429000" y="2438132"/>
+              <a:ext cx="0" cy="259421"/>
+            </a:xfrm>
+            <a:prstGeom prst="straightConnector1">
+              <a:avLst/>
+            </a:prstGeom>
+            <a:ln w="38100">
+              <a:solidFill>
+                <a:schemeClr val="tx1"/>
+              </a:solidFill>
+              <a:tailEnd type="triangle"/>
+            </a:ln>
+          </p:spPr>
+          <p:style>
+            <a:lnRef idx="1">
+              <a:schemeClr val="accent1"/>
+            </a:lnRef>
+            <a:fillRef idx="0">
+              <a:schemeClr val="accent1"/>
+            </a:fillRef>
+            <a:effectRef idx="0">
+              <a:schemeClr val="accent1"/>
+            </a:effectRef>
+            <a:fontRef idx="minor">
+              <a:schemeClr val="tx1"/>
+            </a:fontRef>
+          </p:style>
+        </p:cxnSp>
+        <p:sp>
+          <p:nvSpPr>
+            <p:cNvPr id="107" name="Flowchart: Process 106">
+              <a:extLst>
+                <a:ext uri="{FF2B5EF4-FFF2-40B4-BE49-F238E27FC236}">
+                  <a16:creationId xmlns:a16="http://schemas.microsoft.com/office/drawing/2014/main" id="{EB75F30B-C84A-417C-87EE-00F362A012EE}"/>
+                </a:ext>
+              </a:extLst>
+            </p:cNvPr>
+            <p:cNvSpPr/>
+            <p:nvPr/>
+          </p:nvSpPr>
+          <p:spPr>
+            <a:xfrm>
+              <a:off x="438033" y="4133718"/>
+              <a:ext cx="2100164" cy="777971"/>
+            </a:xfrm>
+            <a:prstGeom prst="flowChartProcess">
+              <a:avLst/>
+            </a:prstGeom>
+            <a:gradFill flip="none" rotWithShape="1">
+              <a:gsLst>
+                <a:gs pos="0">
+                  <a:schemeClr val="accent5">
+                    <a:lumMod val="67000"/>
+                  </a:schemeClr>
+                </a:gs>
+                <a:gs pos="48000">
+                  <a:schemeClr val="accent5">
+                    <a:lumMod val="97000"/>
+                    <a:lumOff val="3000"/>
+                  </a:schemeClr>
+                </a:gs>
+                <a:gs pos="100000">
+                  <a:schemeClr val="accent5">
+                    <a:lumMod val="60000"/>
+                    <a:lumOff val="40000"/>
+                  </a:schemeClr>
+                </a:gs>
+              </a:gsLst>
+              <a:lin ang="16200000" scaled="1"/>
+              <a:tileRect/>
+            </a:gradFill>
+            <a:ln>
+              <a:solidFill>
+                <a:srgbClr val="0070C0"/>
+              </a:solidFill>
+            </a:ln>
+          </p:spPr>
+          <p:style>
+            <a:lnRef idx="0">
+              <a:scrgbClr r="0" g="0" b="0"/>
+            </a:lnRef>
+            <a:fillRef idx="0">
+              <a:scrgbClr r="0" g="0" b="0"/>
+            </a:fillRef>
+            <a:effectRef idx="0">
+              <a:scrgbClr r="0" g="0" b="0"/>
+            </a:effectRef>
+            <a:fontRef idx="minor">
+              <a:schemeClr val="lt1"/>
+            </a:fontRef>
+          </p:style>
+          <p:txBody>
+            <a:bodyPr rtlCol="0" anchor="ctr"/>
+            <a:lstStyle/>
+            <a:p>
+              <a:pPr algn="ctr"/>
+              <a:r>
+                <a:rPr lang="en-GB" dirty="0"/>
+                <a:t>Use X Window (GUI) or Command Line</a:t>
+              </a:r>
+            </a:p>
+          </p:txBody>
+        </p:sp>
+        <p:sp>
+          <p:nvSpPr>
+            <p:cNvPr id="113" name="Flowchart: Process 112">
+              <a:extLst>
+                <a:ext uri="{FF2B5EF4-FFF2-40B4-BE49-F238E27FC236}">
+                  <a16:creationId xmlns:a16="http://schemas.microsoft.com/office/drawing/2014/main" id="{7B8A4740-3972-4C0E-B3E6-AC9244CF2247}"/>
+                </a:ext>
+              </a:extLst>
+            </p:cNvPr>
+            <p:cNvSpPr/>
+            <p:nvPr/>
+          </p:nvSpPr>
+          <p:spPr>
+            <a:xfrm>
+              <a:off x="4318086" y="3596419"/>
+              <a:ext cx="2100164" cy="777971"/>
+            </a:xfrm>
+            <a:prstGeom prst="flowChartProcess">
+              <a:avLst/>
+            </a:prstGeom>
+            <a:gradFill flip="none" rotWithShape="1">
+              <a:gsLst>
+                <a:gs pos="0">
+                  <a:schemeClr val="accent5">
+                    <a:lumMod val="67000"/>
+                  </a:schemeClr>
+                </a:gs>
+                <a:gs pos="48000">
+                  <a:schemeClr val="accent5">
+                    <a:lumMod val="97000"/>
+                    <a:lumOff val="3000"/>
+                  </a:schemeClr>
+                </a:gs>
+                <a:gs pos="100000">
+                  <a:schemeClr val="accent5">
+                    <a:lumMod val="60000"/>
+                    <a:lumOff val="40000"/>
+                  </a:schemeClr>
+                </a:gs>
+              </a:gsLst>
+              <a:lin ang="16200000" scaled="1"/>
+              <a:tileRect/>
+            </a:gradFill>
+            <a:ln>
+              <a:solidFill>
+                <a:srgbClr val="0070C0"/>
+              </a:solidFill>
+            </a:ln>
+          </p:spPr>
+          <p:style>
+            <a:lnRef idx="0">
+              <a:scrgbClr r="0" g="0" b="0"/>
+            </a:lnRef>
+            <a:fillRef idx="0">
+              <a:scrgbClr r="0" g="0" b="0"/>
+            </a:fillRef>
+            <a:effectRef idx="0">
+              <a:scrgbClr r="0" g="0" b="0"/>
+            </a:effectRef>
+            <a:fontRef idx="minor">
+              <a:schemeClr val="lt1"/>
+            </a:fontRef>
+          </p:style>
+          <p:txBody>
+            <a:bodyPr rtlCol="0" anchor="ctr"/>
+            <a:lstStyle/>
+            <a:p>
+              <a:pPr algn="ctr"/>
+              <a:r>
+                <a:rPr lang="en-GB" dirty="0"/>
+                <a:t>Enable SSH, Ethernet Cable</a:t>
+              </a:r>
+            </a:p>
+          </p:txBody>
+        </p:sp>
+        <p:sp>
+          <p:nvSpPr>
+            <p:cNvPr id="114" name="TextBox 113">
+              <a:extLst>
+                <a:ext uri="{FF2B5EF4-FFF2-40B4-BE49-F238E27FC236}">
+                  <a16:creationId xmlns:a16="http://schemas.microsoft.com/office/drawing/2014/main" id="{200C5178-4545-438E-9CF6-5C493D7C90F7}"/>
+                </a:ext>
+              </a:extLst>
+            </p:cNvPr>
+            <p:cNvSpPr txBox="1"/>
+            <p:nvPr/>
+          </p:nvSpPr>
+          <p:spPr>
+            <a:xfrm>
+              <a:off x="4397293" y="2973374"/>
+              <a:ext cx="1441450" cy="338554"/>
+            </a:xfrm>
+            <a:prstGeom prst="rect">
+              <a:avLst/>
+            </a:prstGeom>
+            <a:noFill/>
+          </p:spPr>
+          <p:txBody>
+            <a:bodyPr wrap="square" rtlCol="0">
+              <a:spAutoFit/>
+            </a:bodyPr>
+            <a:lstStyle/>
+            <a:p>
+              <a:pPr algn="ctr"/>
+              <a:r>
+                <a:rPr lang="en-GB" sz="1600" dirty="0"/>
+                <a:t>No</a:t>
+              </a:r>
+            </a:p>
+          </p:txBody>
+        </p:sp>
+        <p:sp>
+          <p:nvSpPr>
+            <p:cNvPr id="122" name="Flowchart: Process 121">
+              <a:extLst>
+                <a:ext uri="{FF2B5EF4-FFF2-40B4-BE49-F238E27FC236}">
+                  <a16:creationId xmlns:a16="http://schemas.microsoft.com/office/drawing/2014/main" id="{FD3E6DC6-FD76-4BDF-B82C-1AA3FC3C761C}"/>
+                </a:ext>
+              </a:extLst>
+            </p:cNvPr>
+            <p:cNvSpPr/>
+            <p:nvPr/>
+          </p:nvSpPr>
+          <p:spPr>
+            <a:xfrm>
+              <a:off x="4318086" y="4656564"/>
+              <a:ext cx="2100164" cy="777971"/>
+            </a:xfrm>
+            <a:prstGeom prst="flowChartProcess">
+              <a:avLst/>
+            </a:prstGeom>
+            <a:gradFill flip="none" rotWithShape="1">
+              <a:gsLst>
+                <a:gs pos="0">
+                  <a:schemeClr val="accent5">
+                    <a:lumMod val="67000"/>
+                  </a:schemeClr>
+                </a:gs>
+                <a:gs pos="48000">
+                  <a:schemeClr val="accent5">
+                    <a:lumMod val="97000"/>
+                    <a:lumOff val="3000"/>
+                  </a:schemeClr>
+                </a:gs>
+                <a:gs pos="100000">
+                  <a:schemeClr val="accent5">
+                    <a:lumMod val="60000"/>
+                    <a:lumOff val="40000"/>
+                  </a:schemeClr>
+                </a:gs>
+              </a:gsLst>
+              <a:lin ang="16200000" scaled="1"/>
+              <a:tileRect/>
+            </a:gradFill>
+            <a:ln>
+              <a:solidFill>
+                <a:srgbClr val="0070C0"/>
+              </a:solidFill>
+            </a:ln>
+          </p:spPr>
+          <p:style>
+            <a:lnRef idx="0">
+              <a:scrgbClr r="0" g="0" b="0"/>
+            </a:lnRef>
+            <a:fillRef idx="0">
+              <a:scrgbClr r="0" g="0" b="0"/>
+            </a:fillRef>
+            <a:effectRef idx="0">
+              <a:scrgbClr r="0" g="0" b="0"/>
+            </a:effectRef>
+            <a:fontRef idx="minor">
+              <a:schemeClr val="lt1"/>
+            </a:fontRef>
+          </p:style>
+          <p:txBody>
+            <a:bodyPr rtlCol="0" anchor="ctr"/>
+            <a:lstStyle/>
+            <a:p>
+              <a:pPr algn="ctr"/>
+              <a:r>
+                <a:rPr lang="en-GB" dirty="0"/>
+                <a:t>Use SSH (CLI),  then Set Up VNC (GUI)</a:t>
+              </a:r>
+            </a:p>
+          </p:txBody>
+        </p:sp>
+        <p:cxnSp>
+          <p:nvCxnSpPr>
+            <p:cNvPr id="123" name="Straight Arrow Connector 122">
+              <a:extLst>
+                <a:ext uri="{FF2B5EF4-FFF2-40B4-BE49-F238E27FC236}">
+                  <a16:creationId xmlns:a16="http://schemas.microsoft.com/office/drawing/2014/main" id="{2708A7B0-E538-47E3-81AB-53684DD719F0}"/>
+                </a:ext>
+              </a:extLst>
+            </p:cNvPr>
+            <p:cNvCxnSpPr>
+              <a:cxnSpLocks/>
+              <a:stCxn id="113" idx="2"/>
+              <a:endCxn id="122" idx="0"/>
+            </p:cNvCxnSpPr>
+            <p:nvPr/>
+          </p:nvCxnSpPr>
+          <p:spPr>
+            <a:xfrm>
+              <a:off x="5368168" y="4374390"/>
+              <a:ext cx="0" cy="282174"/>
+            </a:xfrm>
+            <a:prstGeom prst="straightConnector1">
+              <a:avLst/>
+            </a:prstGeom>
+            <a:ln w="38100">
+              <a:solidFill>
+                <a:schemeClr val="tx1"/>
+              </a:solidFill>
+              <a:tailEnd type="triangle"/>
+            </a:ln>
+          </p:spPr>
+          <p:style>
+            <a:lnRef idx="1">
+              <a:schemeClr val="accent1"/>
+            </a:lnRef>
+            <a:fillRef idx="0">
+              <a:schemeClr val="accent1"/>
+            </a:fillRef>
+            <a:effectRef idx="0">
+              <a:schemeClr val="accent1"/>
+            </a:effectRef>
+            <a:fontRef idx="minor">
+              <a:schemeClr val="tx1"/>
+            </a:fontRef>
+          </p:style>
+        </p:cxnSp>
+        <p:sp>
+          <p:nvSpPr>
+            <p:cNvPr id="141" name="Flowchart: Process 140">
+              <a:extLst>
+                <a:ext uri="{FF2B5EF4-FFF2-40B4-BE49-F238E27FC236}">
+                  <a16:creationId xmlns:a16="http://schemas.microsoft.com/office/drawing/2014/main" id="{A26C1BE7-45C0-489C-A71E-19872EDFD61C}"/>
+                </a:ext>
+              </a:extLst>
+            </p:cNvPr>
+            <p:cNvSpPr/>
+            <p:nvPr/>
+          </p:nvSpPr>
+          <p:spPr>
+            <a:xfrm>
+              <a:off x="2378918" y="5823300"/>
+              <a:ext cx="2100164" cy="777971"/>
+            </a:xfrm>
+            <a:prstGeom prst="flowChartProcess">
+              <a:avLst/>
+            </a:prstGeom>
+            <a:gradFill flip="none" rotWithShape="1">
+              <a:gsLst>
+                <a:gs pos="0">
+                  <a:schemeClr val="accent5">
+                    <a:lumMod val="67000"/>
+                  </a:schemeClr>
+                </a:gs>
+                <a:gs pos="48000">
+                  <a:schemeClr val="accent5">
+                    <a:lumMod val="97000"/>
+                    <a:lumOff val="3000"/>
+                  </a:schemeClr>
+                </a:gs>
+                <a:gs pos="100000">
+                  <a:schemeClr val="accent5">
+                    <a:lumMod val="60000"/>
+                    <a:lumOff val="40000"/>
+                  </a:schemeClr>
+                </a:gs>
+              </a:gsLst>
+              <a:lin ang="16200000" scaled="1"/>
+              <a:tileRect/>
+            </a:gradFill>
+            <a:ln>
+              <a:solidFill>
+                <a:srgbClr val="0070C0"/>
+              </a:solidFill>
+            </a:ln>
+          </p:spPr>
+          <p:style>
+            <a:lnRef idx="0">
+              <a:scrgbClr r="0" g="0" b="0"/>
+            </a:lnRef>
+            <a:fillRef idx="0">
+              <a:scrgbClr r="0" g="0" b="0"/>
+            </a:fillRef>
+            <a:effectRef idx="0">
+              <a:scrgbClr r="0" g="0" b="0"/>
+            </a:effectRef>
+            <a:fontRef idx="minor">
+              <a:schemeClr val="lt1"/>
+            </a:fontRef>
+          </p:style>
+          <p:txBody>
+            <a:bodyPr rtlCol="0" anchor="ctr"/>
+            <a:lstStyle/>
+            <a:p>
+              <a:pPr algn="ctr"/>
+              <a:r>
+                <a:rPr lang="en-GB" dirty="0"/>
+                <a:t>Install Required Packages</a:t>
+              </a:r>
+            </a:p>
+          </p:txBody>
+        </p:sp>
+        <p:cxnSp>
+          <p:nvCxnSpPr>
+            <p:cNvPr id="142" name="Connector: Elbow 141">
+              <a:extLst>
+                <a:ext uri="{FF2B5EF4-FFF2-40B4-BE49-F238E27FC236}">
+                  <a16:creationId xmlns:a16="http://schemas.microsoft.com/office/drawing/2014/main" id="{4BD924D7-F459-43C6-9579-39F7BB564822}"/>
+                </a:ext>
+              </a:extLst>
+            </p:cNvPr>
+            <p:cNvCxnSpPr>
+              <a:cxnSpLocks/>
+              <a:stCxn id="107" idx="2"/>
+              <a:endCxn id="141" idx="0"/>
+            </p:cNvCxnSpPr>
+            <p:nvPr/>
+          </p:nvCxnSpPr>
+          <p:spPr>
+            <a:xfrm rot="16200000" flipH="1">
+              <a:off x="2002752" y="4397051"/>
+              <a:ext cx="911611" cy="1940885"/>
+            </a:xfrm>
+            <a:prstGeom prst="bentConnector3">
+              <a:avLst>
+                <a:gd name="adj1" fmla="val 78855"/>
+              </a:avLst>
+            </a:prstGeom>
+            <a:ln w="38100">
+              <a:solidFill>
+                <a:schemeClr val="tx1"/>
+              </a:solidFill>
+              <a:tailEnd type="triangle"/>
+            </a:ln>
+          </p:spPr>
+          <p:style>
+            <a:lnRef idx="1">
+              <a:schemeClr val="accent1"/>
+            </a:lnRef>
+            <a:fillRef idx="0">
+              <a:schemeClr val="accent1"/>
+            </a:fillRef>
+            <a:effectRef idx="0">
+              <a:schemeClr val="accent1"/>
+            </a:effectRef>
+            <a:fontRef idx="minor">
+              <a:schemeClr val="tx1"/>
+            </a:fontRef>
+          </p:style>
+        </p:cxnSp>
+        <p:cxnSp>
+          <p:nvCxnSpPr>
+            <p:cNvPr id="145" name="Connector: Elbow 144">
+              <a:extLst>
+                <a:ext uri="{FF2B5EF4-FFF2-40B4-BE49-F238E27FC236}">
+                  <a16:creationId xmlns:a16="http://schemas.microsoft.com/office/drawing/2014/main" id="{EA5180E4-87D4-4CB9-A96B-000B3ACBA8AD}"/>
+                </a:ext>
+              </a:extLst>
+            </p:cNvPr>
+            <p:cNvCxnSpPr>
+              <a:cxnSpLocks/>
+              <a:stCxn id="122" idx="2"/>
+              <a:endCxn id="141" idx="0"/>
+            </p:cNvCxnSpPr>
+            <p:nvPr/>
+          </p:nvCxnSpPr>
+          <p:spPr>
+            <a:xfrm rot="5400000">
+              <a:off x="4204202" y="4659333"/>
+              <a:ext cx="388765" cy="1939168"/>
+            </a:xfrm>
+            <a:prstGeom prst="bentConnector3">
+              <a:avLst>
+                <a:gd name="adj1" fmla="val 50000"/>
+              </a:avLst>
+            </a:prstGeom>
+            <a:ln w="38100">
+              <a:solidFill>
+                <a:schemeClr val="tx1"/>
+              </a:solidFill>
+              <a:tailEnd type="triangle"/>
+            </a:ln>
+          </p:spPr>
+          <p:style>
+            <a:lnRef idx="1">
+              <a:schemeClr val="accent1"/>
+            </a:lnRef>
+            <a:fillRef idx="0">
+              <a:schemeClr val="accent1"/>
+            </a:fillRef>
+            <a:effectRef idx="0">
+              <a:schemeClr val="accent1"/>
+            </a:effectRef>
+            <a:fontRef idx="minor">
+              <a:schemeClr val="tx1"/>
+            </a:fontRef>
+          </p:style>
+        </p:cxnSp>
+        <p:sp>
+          <p:nvSpPr>
+            <p:cNvPr id="150" name="Flowchart: Process 149">
+              <a:extLst>
+                <a:ext uri="{FF2B5EF4-FFF2-40B4-BE49-F238E27FC236}">
+                  <a16:creationId xmlns:a16="http://schemas.microsoft.com/office/drawing/2014/main" id="{F9272B72-135E-46BC-9B93-C48238D7AA80}"/>
+                </a:ext>
+              </a:extLst>
+            </p:cNvPr>
+            <p:cNvSpPr/>
+            <p:nvPr/>
+          </p:nvSpPr>
+          <p:spPr>
+            <a:xfrm>
+              <a:off x="2378918" y="6859529"/>
+              <a:ext cx="2100164" cy="777971"/>
+            </a:xfrm>
+            <a:prstGeom prst="flowChartProcess">
+              <a:avLst/>
+            </a:prstGeom>
+            <a:gradFill flip="none" rotWithShape="1">
+              <a:gsLst>
+                <a:gs pos="0">
+                  <a:schemeClr val="accent5">
+                    <a:lumMod val="67000"/>
+                  </a:schemeClr>
+                </a:gs>
+                <a:gs pos="48000">
+                  <a:schemeClr val="accent5">
+                    <a:lumMod val="97000"/>
+                    <a:lumOff val="3000"/>
+                  </a:schemeClr>
+                </a:gs>
+                <a:gs pos="100000">
+                  <a:schemeClr val="accent5">
+                    <a:lumMod val="60000"/>
+                    <a:lumOff val="40000"/>
+                  </a:schemeClr>
+                </a:gs>
+              </a:gsLst>
+              <a:lin ang="16200000" scaled="1"/>
+              <a:tileRect/>
+            </a:gradFill>
+            <a:ln>
+              <a:solidFill>
+                <a:srgbClr val="0070C0"/>
+              </a:solidFill>
+            </a:ln>
+          </p:spPr>
+          <p:style>
+            <a:lnRef idx="0">
+              <a:scrgbClr r="0" g="0" b="0"/>
+            </a:lnRef>
+            <a:fillRef idx="0">
+              <a:scrgbClr r="0" g="0" b="0"/>
+            </a:fillRef>
+            <a:effectRef idx="0">
+              <a:scrgbClr r="0" g="0" b="0"/>
+            </a:effectRef>
+            <a:fontRef idx="minor">
+              <a:schemeClr val="lt1"/>
+            </a:fontRef>
+          </p:style>
+          <p:txBody>
+            <a:bodyPr rtlCol="0" anchor="ctr"/>
+            <a:lstStyle/>
+            <a:p>
+              <a:pPr algn="ctr"/>
+              <a:r>
+                <a:rPr lang="en-GB" dirty="0"/>
+                <a:t>Install Required Packages</a:t>
+              </a:r>
+            </a:p>
+          </p:txBody>
+        </p:sp>
+        <p:cxnSp>
+          <p:nvCxnSpPr>
+            <p:cNvPr id="151" name="Straight Arrow Connector 150">
+              <a:extLst>
+                <a:ext uri="{FF2B5EF4-FFF2-40B4-BE49-F238E27FC236}">
+                  <a16:creationId xmlns:a16="http://schemas.microsoft.com/office/drawing/2014/main" id="{95776F86-34BD-494C-8C30-D005781715F8}"/>
+                </a:ext>
+              </a:extLst>
+            </p:cNvPr>
+            <p:cNvCxnSpPr>
+              <a:cxnSpLocks/>
+              <a:stCxn id="141" idx="2"/>
+              <a:endCxn id="150" idx="0"/>
+            </p:cNvCxnSpPr>
+            <p:nvPr/>
+          </p:nvCxnSpPr>
+          <p:spPr>
+            <a:xfrm>
+              <a:off x="3429000" y="6601271"/>
+              <a:ext cx="0" cy="258258"/>
+            </a:xfrm>
+            <a:prstGeom prst="straightConnector1">
+              <a:avLst/>
+            </a:prstGeom>
+            <a:ln w="38100">
+              <a:solidFill>
+                <a:schemeClr val="tx1"/>
+              </a:solidFill>
+              <a:tailEnd type="triangle"/>
+            </a:ln>
+          </p:spPr>
+          <p:style>
+            <a:lnRef idx="1">
+              <a:schemeClr val="accent1"/>
+            </a:lnRef>
+            <a:fillRef idx="0">
+              <a:schemeClr val="accent1"/>
+            </a:fillRef>
+            <a:effectRef idx="0">
+              <a:schemeClr val="accent1"/>
+            </a:effectRef>
+            <a:fontRef idx="minor">
+              <a:schemeClr val="tx1"/>
+            </a:fontRef>
+          </p:style>
+        </p:cxnSp>
+        <p:cxnSp>
+          <p:nvCxnSpPr>
+            <p:cNvPr id="154" name="Straight Arrow Connector 153">
+              <a:extLst>
+                <a:ext uri="{FF2B5EF4-FFF2-40B4-BE49-F238E27FC236}">
+                  <a16:creationId xmlns:a16="http://schemas.microsoft.com/office/drawing/2014/main" id="{5F1436EC-0FA9-47C8-8BC7-38074A7A4F1D}"/>
+                </a:ext>
+              </a:extLst>
+            </p:cNvPr>
+            <p:cNvCxnSpPr>
+              <a:cxnSpLocks/>
+              <a:stCxn id="150" idx="3"/>
+              <a:endCxn id="18" idx="1"/>
+            </p:cNvCxnSpPr>
+            <p:nvPr/>
+          </p:nvCxnSpPr>
+          <p:spPr>
+            <a:xfrm flipV="1">
+              <a:off x="4479082" y="7248514"/>
+              <a:ext cx="285774" cy="1"/>
+            </a:xfrm>
+            <a:prstGeom prst="straightConnector1">
+              <a:avLst/>
+            </a:prstGeom>
+            <a:ln w="38100">
+              <a:solidFill>
+                <a:schemeClr val="tx1"/>
+              </a:solidFill>
+              <a:tailEnd type="triangle"/>
+            </a:ln>
+          </p:spPr>
+          <p:style>
+            <a:lnRef idx="1">
+              <a:schemeClr val="accent1"/>
+            </a:lnRef>
+            <a:fillRef idx="0">
+              <a:schemeClr val="accent1"/>
+            </a:fillRef>
+            <a:effectRef idx="0">
+              <a:schemeClr val="accent1"/>
+            </a:effectRef>
+            <a:fontRef idx="minor">
+              <a:schemeClr val="tx1"/>
+            </a:fontRef>
+          </p:style>
+        </p:cxnSp>
+      </p:grpSp>
+    </p:spTree>
+    <p:extLst>
+      <p:ext uri="{BB962C8B-B14F-4D97-AF65-F5344CB8AC3E}">
+        <p14:creationId xmlns:p14="http://schemas.microsoft.com/office/powerpoint/2010/main" val="3353829994"/>
+      </p:ext>
+    </p:extLst>
+  </p:cSld>
+  <p:clrMapOvr>
+    <a:masterClrMapping/>
+  </p:clrMapOvr>
+</p:sld>
+</file>
+
 <file path=ppt/theme/theme1.xml><?xml version="1.0" encoding="utf-8"?>
 <a:theme xmlns:a="http://schemas.openxmlformats.org/drawingml/2006/main" name="Office Theme">
   <a:themeElements>

</xml_diff>